<commit_message>
First version of insert
</commit_message>
<xml_diff>
--- a/B+ Tree.pptx
+++ b/B+ Tree.pptx
@@ -232,7 +232,7 @@
           <a:p>
             <a:fld id="{966D5B4E-BF3E-3B45-A4BA-D6C3B92870D7}" type="datetimeFigureOut">
               <a:rPr lang="en-US" smtClean="0"/>
-              <a:t>12/8/2019</a:t>
+              <a:t>12/8/19</a:t>
             </a:fld>
             <a:endParaRPr lang="en-US" dirty="0"/>
           </a:p>
@@ -409,7 +409,7 @@
           <a:p>
             <a:fld id="{F5A8621B-8C8E-49BA-8772-41D0FE75A082}" type="datetimeFigureOut">
               <a:rPr lang="en-US" smtClean="0"/>
-              <a:t>12/8/2019</a:t>
+              <a:t>12/8/19</a:t>
             </a:fld>
             <a:endParaRPr lang="en-US" dirty="0"/>
           </a:p>
@@ -1833,7 +1833,7 @@
           </a:ln>
           <a:extLst>
             <a:ext uri="{C572A759-6A51-4108-AA02-DFA0A04FC94B}">
-              <ma14:wrappingTextBoxFlag xmlns="" xmlns:ma14="http://schemas.microsoft.com/office/mac/drawingml/2011/main" val="1"/>
+              <ma14:wrappingTextBoxFlag xmlns:ma14="http://schemas.microsoft.com/office/mac/drawingml/2011/main" xmlns="" val="1"/>
             </a:ext>
           </a:extLst>
         </p:spPr>
@@ -2157,7 +2157,7 @@
           </a:ln>
           <a:extLst>
             <a:ext uri="{C572A759-6A51-4108-AA02-DFA0A04FC94B}">
-              <ma14:wrappingTextBoxFlag xmlns="" xmlns:ma14="http://schemas.microsoft.com/office/mac/drawingml/2011/main" val="1"/>
+              <ma14:wrappingTextBoxFlag xmlns:ma14="http://schemas.microsoft.com/office/mac/drawingml/2011/main" xmlns="" val="1"/>
             </a:ext>
           </a:extLst>
         </p:spPr>
@@ -2611,7 +2611,7 @@
           </a:ln>
           <a:extLst>
             <a:ext uri="{C572A759-6A51-4108-AA02-DFA0A04FC94B}">
-              <ma14:wrappingTextBoxFlag xmlns="" xmlns:ma14="http://schemas.microsoft.com/office/mac/drawingml/2011/main" val="1"/>
+              <ma14:wrappingTextBoxFlag xmlns:ma14="http://schemas.microsoft.com/office/mac/drawingml/2011/main" xmlns="" val="1"/>
             </a:ext>
           </a:extLst>
         </p:spPr>
@@ -3035,7 +3035,7 @@
           </a:ln>
           <a:extLst>
             <a:ext uri="{C572A759-6A51-4108-AA02-DFA0A04FC94B}">
-              <ma14:wrappingTextBoxFlag xmlns="" xmlns:ma14="http://schemas.microsoft.com/office/mac/drawingml/2011/main" val="1"/>
+              <ma14:wrappingTextBoxFlag xmlns:ma14="http://schemas.microsoft.com/office/mac/drawingml/2011/main" xmlns="" val="1"/>
             </a:ext>
           </a:extLst>
         </p:spPr>
@@ -5600,7 +5600,7 @@
           </a:ln>
           <a:extLst>
             <a:ext uri="{C572A759-6A51-4108-AA02-DFA0A04FC94B}">
-              <ma14:wrappingTextBoxFlag xmlns="" xmlns:ma14="http://schemas.microsoft.com/office/mac/drawingml/2011/main" val="1"/>
+              <ma14:wrappingTextBoxFlag xmlns:ma14="http://schemas.microsoft.com/office/mac/drawingml/2011/main" xmlns="" val="1"/>
             </a:ext>
           </a:extLst>
         </p:spPr>
@@ -7037,7 +7037,7 @@
           </a:ln>
           <a:extLst>
             <a:ext uri="{C572A759-6A51-4108-AA02-DFA0A04FC94B}">
-              <ma14:wrappingTextBoxFlag xmlns="" xmlns:ma14="http://schemas.microsoft.com/office/mac/drawingml/2011/main" val="1"/>
+              <ma14:wrappingTextBoxFlag xmlns:ma14="http://schemas.microsoft.com/office/mac/drawingml/2011/main" xmlns="" val="1"/>
             </a:ext>
           </a:extLst>
         </p:spPr>
@@ -9281,6 +9281,9 @@
                     <p:cTn id="3" fill="hold">
                       <p:stCondLst>
                         <p:cond delay="indefinite"/>
+                        <p:cond evt="onBegin" delay="0">
+                          <p:tn val="2"/>
+                        </p:cond>
                       </p:stCondLst>
                       <p:childTnLst>
                         <p:par>
@@ -9290,7 +9293,7 @@
                             </p:stCondLst>
                             <p:childTnLst>
                               <p:par>
-                                <p:cTn id="5" presetID="10" presetClass="entr" presetSubtype="0" fill="hold" nodeType="clickEffect">
+                                <p:cTn id="5" presetID="10" presetClass="entr" presetSubtype="0" fill="hold" nodeType="withEffect">
                                   <p:stCondLst>
                                     <p:cond delay="0"/>
                                   </p:stCondLst>
@@ -10509,6 +10512,9 @@
                     <p:cTn id="3" fill="hold">
                       <p:stCondLst>
                         <p:cond delay="indefinite"/>
+                        <p:cond evt="onBegin" delay="0">
+                          <p:tn val="2"/>
+                        </p:cond>
                       </p:stCondLst>
                       <p:childTnLst>
                         <p:par>
@@ -10518,7 +10524,7 @@
                             </p:stCondLst>
                             <p:childTnLst>
                               <p:par>
-                                <p:cTn id="5" presetID="10" presetClass="entr" presetSubtype="0" fill="hold" grpId="0" nodeType="clickEffect">
+                                <p:cTn id="5" presetID="10" presetClass="entr" presetSubtype="0" fill="hold" grpId="0" nodeType="withEffect">
                                   <p:stCondLst>
                                     <p:cond delay="0"/>
                                   </p:stCondLst>
@@ -10526,6 +10532,223 @@
                                     <p:set>
                                       <p:cBhvr>
                                         <p:cTn id="6" dur="1" fill="hold">
+                                          <p:stCondLst>
+                                            <p:cond delay="0"/>
+                                          </p:stCondLst>
+                                        </p:cTn>
+                                        <p:tgtEl>
+                                          <p:spTgt spid="4">
+                                            <p:txEl>
+                                              <p:pRg st="0" end="0"/>
+                                            </p:txEl>
+                                          </p:spTgt>
+                                        </p:tgtEl>
+                                        <p:attrNameLst>
+                                          <p:attrName>style.visibility</p:attrName>
+                                        </p:attrNameLst>
+                                      </p:cBhvr>
+                                      <p:to>
+                                        <p:strVal val="visible"/>
+                                      </p:to>
+                                    </p:set>
+                                    <p:animEffect transition="in" filter="fade">
+                                      <p:cBhvr>
+                                        <p:cTn id="7" dur="250"/>
+                                        <p:tgtEl>
+                                          <p:spTgt spid="4">
+                                            <p:txEl>
+                                              <p:pRg st="0" end="0"/>
+                                            </p:txEl>
+                                          </p:spTgt>
+                                        </p:tgtEl>
+                                      </p:cBhvr>
+                                    </p:animEffect>
+                                  </p:childTnLst>
+                                </p:cTn>
+                              </p:par>
+                            </p:childTnLst>
+                          </p:cTn>
+                        </p:par>
+                        <p:par>
+                          <p:cTn id="8" fill="hold">
+                            <p:stCondLst>
+                              <p:cond delay="250"/>
+                            </p:stCondLst>
+                            <p:childTnLst>
+                              <p:par>
+                                <p:cTn id="9" presetID="10" presetClass="entr" presetSubtype="0" fill="hold" grpId="0" nodeType="afterEffect">
+                                  <p:stCondLst>
+                                    <p:cond delay="0"/>
+                                  </p:stCondLst>
+                                  <p:childTnLst>
+                                    <p:set>
+                                      <p:cBhvr>
+                                        <p:cTn id="10" dur="1" fill="hold">
+                                          <p:stCondLst>
+                                            <p:cond delay="0"/>
+                                          </p:stCondLst>
+                                        </p:cTn>
+                                        <p:tgtEl>
+                                          <p:spTgt spid="4">
+                                            <p:txEl>
+                                              <p:pRg st="1" end="1"/>
+                                            </p:txEl>
+                                          </p:spTgt>
+                                        </p:tgtEl>
+                                        <p:attrNameLst>
+                                          <p:attrName>style.visibility</p:attrName>
+                                        </p:attrNameLst>
+                                      </p:cBhvr>
+                                      <p:to>
+                                        <p:strVal val="visible"/>
+                                      </p:to>
+                                    </p:set>
+                                    <p:animEffect transition="in" filter="fade">
+                                      <p:cBhvr>
+                                        <p:cTn id="11" dur="250"/>
+                                        <p:tgtEl>
+                                          <p:spTgt spid="4">
+                                            <p:txEl>
+                                              <p:pRg st="1" end="1"/>
+                                            </p:txEl>
+                                          </p:spTgt>
+                                        </p:tgtEl>
+                                      </p:cBhvr>
+                                    </p:animEffect>
+                                  </p:childTnLst>
+                                </p:cTn>
+                              </p:par>
+                            </p:childTnLst>
+                          </p:cTn>
+                        </p:par>
+                        <p:par>
+                          <p:cTn id="12" fill="hold">
+                            <p:stCondLst>
+                              <p:cond delay="500"/>
+                            </p:stCondLst>
+                            <p:childTnLst>
+                              <p:par>
+                                <p:cTn id="13" presetID="10" presetClass="entr" presetSubtype="0" fill="hold" grpId="0" nodeType="afterEffect">
+                                  <p:stCondLst>
+                                    <p:cond delay="0"/>
+                                  </p:stCondLst>
+                                  <p:childTnLst>
+                                    <p:set>
+                                      <p:cBhvr>
+                                        <p:cTn id="14" dur="1" fill="hold">
+                                          <p:stCondLst>
+                                            <p:cond delay="0"/>
+                                          </p:stCondLst>
+                                        </p:cTn>
+                                        <p:tgtEl>
+                                          <p:spTgt spid="4">
+                                            <p:txEl>
+                                              <p:pRg st="2" end="2"/>
+                                            </p:txEl>
+                                          </p:spTgt>
+                                        </p:tgtEl>
+                                        <p:attrNameLst>
+                                          <p:attrName>style.visibility</p:attrName>
+                                        </p:attrNameLst>
+                                      </p:cBhvr>
+                                      <p:to>
+                                        <p:strVal val="visible"/>
+                                      </p:to>
+                                    </p:set>
+                                    <p:animEffect transition="in" filter="fade">
+                                      <p:cBhvr>
+                                        <p:cTn id="15" dur="250"/>
+                                        <p:tgtEl>
+                                          <p:spTgt spid="4">
+                                            <p:txEl>
+                                              <p:pRg st="2" end="2"/>
+                                            </p:txEl>
+                                          </p:spTgt>
+                                        </p:tgtEl>
+                                      </p:cBhvr>
+                                    </p:animEffect>
+                                  </p:childTnLst>
+                                </p:cTn>
+                              </p:par>
+                            </p:childTnLst>
+                          </p:cTn>
+                        </p:par>
+                        <p:par>
+                          <p:cTn id="16" fill="hold">
+                            <p:stCondLst>
+                              <p:cond delay="750"/>
+                            </p:stCondLst>
+                            <p:childTnLst>
+                              <p:par>
+                                <p:cTn id="17" presetID="10" presetClass="entr" presetSubtype="0" fill="hold" grpId="0" nodeType="afterEffect">
+                                  <p:stCondLst>
+                                    <p:cond delay="0"/>
+                                  </p:stCondLst>
+                                  <p:childTnLst>
+                                    <p:set>
+                                      <p:cBhvr>
+                                        <p:cTn id="18" dur="1" fill="hold">
+                                          <p:stCondLst>
+                                            <p:cond delay="0"/>
+                                          </p:stCondLst>
+                                        </p:cTn>
+                                        <p:tgtEl>
+                                          <p:spTgt spid="4">
+                                            <p:txEl>
+                                              <p:pRg st="3" end="3"/>
+                                            </p:txEl>
+                                          </p:spTgt>
+                                        </p:tgtEl>
+                                        <p:attrNameLst>
+                                          <p:attrName>style.visibility</p:attrName>
+                                        </p:attrNameLst>
+                                      </p:cBhvr>
+                                      <p:to>
+                                        <p:strVal val="visible"/>
+                                      </p:to>
+                                    </p:set>
+                                    <p:animEffect transition="in" filter="fade">
+                                      <p:cBhvr>
+                                        <p:cTn id="19" dur="250"/>
+                                        <p:tgtEl>
+                                          <p:spTgt spid="4">
+                                            <p:txEl>
+                                              <p:pRg st="3" end="3"/>
+                                            </p:txEl>
+                                          </p:spTgt>
+                                        </p:tgtEl>
+                                      </p:cBhvr>
+                                    </p:animEffect>
+                                  </p:childTnLst>
+                                </p:cTn>
+                              </p:par>
+                            </p:childTnLst>
+                          </p:cTn>
+                        </p:par>
+                      </p:childTnLst>
+                    </p:cTn>
+                  </p:par>
+                  <p:par>
+                    <p:cTn id="20" fill="hold">
+                      <p:stCondLst>
+                        <p:cond delay="indefinite"/>
+                      </p:stCondLst>
+                      <p:childTnLst>
+                        <p:par>
+                          <p:cTn id="21" fill="hold">
+                            <p:stCondLst>
+                              <p:cond delay="0"/>
+                            </p:stCondLst>
+                            <p:childTnLst>
+                              <p:par>
+                                <p:cTn id="22" presetID="10" presetClass="entr" presetSubtype="0" fill="hold" grpId="0" nodeType="clickEffect">
+                                  <p:stCondLst>
+                                    <p:cond delay="0"/>
+                                  </p:stCondLst>
+                                  <p:childTnLst>
+                                    <p:set>
+                                      <p:cBhvr>
+                                        <p:cTn id="23" dur="1" fill="hold">
                                           <p:stCondLst>
                                             <p:cond delay="0"/>
                                           </p:stCondLst>
@@ -10543,7 +10766,7 @@
                                     </p:set>
                                     <p:animEffect transition="in" filter="fade">
                                       <p:cBhvr>
-                                        <p:cTn id="7" dur="250"/>
+                                        <p:cTn id="24" dur="250"/>
                                         <p:tgtEl>
                                           <p:spTgt spid="6"/>
                                         </p:tgtEl>
@@ -10553,14 +10776,14 @@
                                 </p:cTn>
                               </p:par>
                               <p:par>
-                                <p:cTn id="8" presetID="10" presetClass="entr" presetSubtype="0" fill="hold" grpId="0" nodeType="withEffect">
+                                <p:cTn id="25" presetID="10" presetClass="entr" presetSubtype="0" fill="hold" grpId="0" nodeType="withEffect">
                                   <p:stCondLst>
                                     <p:cond delay="0"/>
                                   </p:stCondLst>
                                   <p:childTnLst>
                                     <p:set>
                                       <p:cBhvr>
-                                        <p:cTn id="9" dur="1" fill="hold">
+                                        <p:cTn id="26" dur="1" fill="hold">
                                           <p:stCondLst>
                                             <p:cond delay="0"/>
                                           </p:stCondLst>
@@ -10578,7 +10801,7 @@
                                     </p:set>
                                     <p:animEffect transition="in" filter="fade">
                                       <p:cBhvr>
-                                        <p:cTn id="10" dur="250"/>
+                                        <p:cTn id="27" dur="250"/>
                                         <p:tgtEl>
                                           <p:spTgt spid="7"/>
                                         </p:tgtEl>
@@ -10588,14 +10811,14 @@
                                 </p:cTn>
                               </p:par>
                               <p:par>
-                                <p:cTn id="11" presetID="10" presetClass="entr" presetSubtype="0" fill="hold" grpId="0" nodeType="withEffect">
+                                <p:cTn id="28" presetID="10" presetClass="entr" presetSubtype="0" fill="hold" grpId="0" nodeType="withEffect">
                                   <p:stCondLst>
                                     <p:cond delay="0"/>
                                   </p:stCondLst>
                                   <p:childTnLst>
                                     <p:set>
                                       <p:cBhvr>
-                                        <p:cTn id="12" dur="1" fill="hold">
+                                        <p:cTn id="29" dur="1" fill="hold">
                                           <p:stCondLst>
                                             <p:cond delay="0"/>
                                           </p:stCondLst>
@@ -10613,7 +10836,7 @@
                                     </p:set>
                                     <p:animEffect transition="in" filter="fade">
                                       <p:cBhvr>
-                                        <p:cTn id="13" dur="250"/>
+                                        <p:cTn id="30" dur="250"/>
                                         <p:tgtEl>
                                           <p:spTgt spid="8"/>
                                         </p:tgtEl>
@@ -10623,14 +10846,14 @@
                                 </p:cTn>
                               </p:par>
                               <p:par>
-                                <p:cTn id="14" presetID="10" presetClass="entr" presetSubtype="0" fill="hold" grpId="0" nodeType="withEffect">
+                                <p:cTn id="31" presetID="10" presetClass="entr" presetSubtype="0" fill="hold" grpId="0" nodeType="withEffect">
                                   <p:stCondLst>
                                     <p:cond delay="0"/>
                                   </p:stCondLst>
                                   <p:childTnLst>
                                     <p:set>
                                       <p:cBhvr>
-                                        <p:cTn id="15" dur="1" fill="hold">
+                                        <p:cTn id="32" dur="1" fill="hold">
                                           <p:stCondLst>
                                             <p:cond delay="0"/>
                                           </p:stCondLst>
@@ -10648,7 +10871,7 @@
                                     </p:set>
                                     <p:animEffect transition="in" filter="fade">
                                       <p:cBhvr>
-                                        <p:cTn id="16" dur="250"/>
+                                        <p:cTn id="33" dur="250"/>
                                         <p:tgtEl>
                                           <p:spTgt spid="9"/>
                                         </p:tgtEl>
@@ -10658,14 +10881,14 @@
                                 </p:cTn>
                               </p:par>
                               <p:par>
-                                <p:cTn id="17" presetID="10" presetClass="entr" presetSubtype="0" fill="hold" grpId="0" nodeType="withEffect">
+                                <p:cTn id="34" presetID="10" presetClass="entr" presetSubtype="0" fill="hold" grpId="0" nodeType="withEffect">
                                   <p:stCondLst>
                                     <p:cond delay="0"/>
                                   </p:stCondLst>
                                   <p:childTnLst>
                                     <p:set>
                                       <p:cBhvr>
-                                        <p:cTn id="18" dur="1" fill="hold">
+                                        <p:cTn id="35" dur="1" fill="hold">
                                           <p:stCondLst>
                                             <p:cond delay="0"/>
                                           </p:stCondLst>
@@ -10683,7 +10906,7 @@
                                     </p:set>
                                     <p:animEffect transition="in" filter="fade">
                                       <p:cBhvr>
-                                        <p:cTn id="19" dur="250"/>
+                                        <p:cTn id="36" dur="250"/>
                                         <p:tgtEl>
                                           <p:spTgt spid="10"/>
                                         </p:tgtEl>
@@ -10696,20 +10919,20 @@
                           </p:cTn>
                         </p:par>
                         <p:par>
-                          <p:cTn id="20" fill="hold">
+                          <p:cTn id="37" fill="hold">
                             <p:stCondLst>
                               <p:cond delay="250"/>
                             </p:stCondLst>
                             <p:childTnLst>
                               <p:par>
-                                <p:cTn id="21" presetID="10" presetClass="entr" presetSubtype="0" fill="hold" nodeType="afterEffect">
+                                <p:cTn id="38" presetID="10" presetClass="entr" presetSubtype="0" fill="hold" nodeType="afterEffect">
                                   <p:stCondLst>
                                     <p:cond delay="0"/>
                                   </p:stCondLst>
                                   <p:childTnLst>
                                     <p:set>
                                       <p:cBhvr>
-                                        <p:cTn id="22" dur="1" fill="hold">
+                                        <p:cTn id="39" dur="1" fill="hold">
                                           <p:stCondLst>
                                             <p:cond delay="0"/>
                                           </p:stCondLst>
@@ -10727,7 +10950,7 @@
                                     </p:set>
                                     <p:animEffect transition="in" filter="fade">
                                       <p:cBhvr>
-                                        <p:cTn id="23" dur="250"/>
+                                        <p:cTn id="40" dur="250"/>
                                         <p:tgtEl>
                                           <p:spTgt spid="12"/>
                                         </p:tgtEl>
@@ -10737,14 +10960,14 @@
                                 </p:cTn>
                               </p:par>
                               <p:par>
-                                <p:cTn id="24" presetID="10" presetClass="entr" presetSubtype="0" fill="hold" nodeType="withEffect">
+                                <p:cTn id="41" presetID="10" presetClass="entr" presetSubtype="0" fill="hold" nodeType="withEffect">
                                   <p:stCondLst>
                                     <p:cond delay="0"/>
                                   </p:stCondLst>
                                   <p:childTnLst>
                                     <p:set>
                                       <p:cBhvr>
-                                        <p:cTn id="25" dur="1" fill="hold">
+                                        <p:cTn id="42" dur="1" fill="hold">
                                           <p:stCondLst>
                                             <p:cond delay="0"/>
                                           </p:stCondLst>
@@ -10762,7 +10985,7 @@
                                     </p:set>
                                     <p:animEffect transition="in" filter="fade">
                                       <p:cBhvr>
-                                        <p:cTn id="26" dur="250"/>
+                                        <p:cTn id="43" dur="250"/>
                                         <p:tgtEl>
                                           <p:spTgt spid="13"/>
                                         </p:tgtEl>
@@ -10772,14 +10995,14 @@
                                 </p:cTn>
                               </p:par>
                               <p:par>
-                                <p:cTn id="27" presetID="10" presetClass="entr" presetSubtype="0" fill="hold" nodeType="withEffect">
+                                <p:cTn id="44" presetID="10" presetClass="entr" presetSubtype="0" fill="hold" nodeType="withEffect">
                                   <p:stCondLst>
                                     <p:cond delay="0"/>
                                   </p:stCondLst>
                                   <p:childTnLst>
                                     <p:set>
                                       <p:cBhvr>
-                                        <p:cTn id="28" dur="1" fill="hold">
+                                        <p:cTn id="45" dur="1" fill="hold">
                                           <p:stCondLst>
                                             <p:cond delay="0"/>
                                           </p:stCondLst>
@@ -10797,7 +11020,7 @@
                                     </p:set>
                                     <p:animEffect transition="in" filter="fade">
                                       <p:cBhvr>
-                                        <p:cTn id="29" dur="250"/>
+                                        <p:cTn id="46" dur="250"/>
                                         <p:tgtEl>
                                           <p:spTgt spid="14"/>
                                         </p:tgtEl>
@@ -10807,14 +11030,14 @@
                                 </p:cTn>
                               </p:par>
                               <p:par>
-                                <p:cTn id="30" presetID="10" presetClass="entr" presetSubtype="0" fill="hold" nodeType="withEffect">
+                                <p:cTn id="47" presetID="10" presetClass="entr" presetSubtype="0" fill="hold" nodeType="withEffect">
                                   <p:stCondLst>
                                     <p:cond delay="0"/>
                                   </p:stCondLst>
                                   <p:childTnLst>
                                     <p:set>
                                       <p:cBhvr>
-                                        <p:cTn id="31" dur="1" fill="hold">
+                                        <p:cTn id="48" dur="1" fill="hold">
                                           <p:stCondLst>
                                             <p:cond delay="0"/>
                                           </p:stCondLst>
@@ -10832,7 +11055,7 @@
                                     </p:set>
                                     <p:animEffect transition="in" filter="fade">
                                       <p:cBhvr>
-                                        <p:cTn id="32" dur="250"/>
+                                        <p:cTn id="49" dur="250"/>
                                         <p:tgtEl>
                                           <p:spTgt spid="15"/>
                                         </p:tgtEl>
@@ -10848,26 +11071,26 @@
                     </p:cTn>
                   </p:par>
                   <p:par>
-                    <p:cTn id="33" fill="hold">
+                    <p:cTn id="50" fill="hold">
                       <p:stCondLst>
                         <p:cond delay="indefinite"/>
                       </p:stCondLst>
                       <p:childTnLst>
                         <p:par>
-                          <p:cTn id="34" fill="hold">
+                          <p:cTn id="51" fill="hold">
                             <p:stCondLst>
                               <p:cond delay="0"/>
                             </p:stCondLst>
                             <p:childTnLst>
                               <p:par>
-                                <p:cTn id="35" presetID="10" presetClass="entr" presetSubtype="0" fill="hold" grpId="0" nodeType="clickEffect">
+                                <p:cTn id="52" presetID="10" presetClass="entr" presetSubtype="0" fill="hold" grpId="0" nodeType="clickEffect">
                                   <p:stCondLst>
                                     <p:cond delay="0"/>
                                   </p:stCondLst>
                                   <p:childTnLst>
                                     <p:set>
                                       <p:cBhvr>
-                                        <p:cTn id="36" dur="1" fill="hold">
+                                        <p:cTn id="53" dur="1" fill="hold">
                                           <p:stCondLst>
                                             <p:cond delay="0"/>
                                           </p:stCondLst>
@@ -10885,7 +11108,7 @@
                                     </p:set>
                                     <p:animEffect transition="in" filter="fade">
                                       <p:cBhvr>
-                                        <p:cTn id="37" dur="250"/>
+                                        <p:cTn id="54" dur="250"/>
                                         <p:tgtEl>
                                           <p:spTgt spid="16"/>
                                         </p:tgtEl>
@@ -10895,14 +11118,14 @@
                                 </p:cTn>
                               </p:par>
                               <p:par>
-                                <p:cTn id="38" presetID="10" presetClass="entr" presetSubtype="0" fill="hold" grpId="0" nodeType="withEffect">
+                                <p:cTn id="55" presetID="10" presetClass="entr" presetSubtype="0" fill="hold" grpId="0" nodeType="withEffect">
                                   <p:stCondLst>
                                     <p:cond delay="0"/>
                                   </p:stCondLst>
                                   <p:childTnLst>
                                     <p:set>
                                       <p:cBhvr>
-                                        <p:cTn id="39" dur="1" fill="hold">
+                                        <p:cTn id="56" dur="1" fill="hold">
                                           <p:stCondLst>
                                             <p:cond delay="0"/>
                                           </p:stCondLst>
@@ -10920,7 +11143,7 @@
                                     </p:set>
                                     <p:animEffect transition="in" filter="fade">
                                       <p:cBhvr>
-                                        <p:cTn id="40" dur="250"/>
+                                        <p:cTn id="57" dur="250"/>
                                         <p:tgtEl>
                                           <p:spTgt spid="17"/>
                                         </p:tgtEl>
@@ -10933,20 +11156,20 @@
                           </p:cTn>
                         </p:par>
                         <p:par>
-                          <p:cTn id="41" fill="hold">
+                          <p:cTn id="58" fill="hold">
                             <p:stCondLst>
                               <p:cond delay="250"/>
                             </p:stCondLst>
                             <p:childTnLst>
                               <p:par>
-                                <p:cTn id="42" presetID="10" presetClass="entr" presetSubtype="0" fill="hold" nodeType="afterEffect">
+                                <p:cTn id="59" presetID="10" presetClass="entr" presetSubtype="0" fill="hold" nodeType="afterEffect">
                                   <p:stCondLst>
                                     <p:cond delay="0"/>
                                   </p:stCondLst>
                                   <p:childTnLst>
                                     <p:set>
                                       <p:cBhvr>
-                                        <p:cTn id="43" dur="1" fill="hold">
+                                        <p:cTn id="60" dur="1" fill="hold">
                                           <p:stCondLst>
                                             <p:cond delay="0"/>
                                           </p:stCondLst>
@@ -10964,7 +11187,7 @@
                                     </p:set>
                                     <p:animEffect transition="in" filter="fade">
                                       <p:cBhvr>
-                                        <p:cTn id="44" dur="250"/>
+                                        <p:cTn id="61" dur="250"/>
                                         <p:tgtEl>
                                           <p:spTgt spid="22"/>
                                         </p:tgtEl>
@@ -10974,14 +11197,14 @@
                                 </p:cTn>
                               </p:par>
                               <p:par>
-                                <p:cTn id="45" presetID="10" presetClass="entr" presetSubtype="0" fill="hold" nodeType="withEffect">
+                                <p:cTn id="62" presetID="10" presetClass="entr" presetSubtype="0" fill="hold" nodeType="withEffect">
                                   <p:stCondLst>
                                     <p:cond delay="0"/>
                                   </p:stCondLst>
                                   <p:childTnLst>
                                     <p:set>
                                       <p:cBhvr>
-                                        <p:cTn id="46" dur="1" fill="hold">
+                                        <p:cTn id="63" dur="1" fill="hold">
                                           <p:stCondLst>
                                             <p:cond delay="0"/>
                                           </p:stCondLst>
@@ -10999,202 +11222,9 @@
                                     </p:set>
                                     <p:animEffect transition="in" filter="fade">
                                       <p:cBhvr>
-                                        <p:cTn id="47" dur="250"/>
+                                        <p:cTn id="64" dur="250"/>
                                         <p:tgtEl>
                                           <p:spTgt spid="27"/>
-                                        </p:tgtEl>
-                                      </p:cBhvr>
-                                    </p:animEffect>
-                                  </p:childTnLst>
-                                </p:cTn>
-                              </p:par>
-                              <p:par>
-                                <p:cTn id="48" presetID="10" presetClass="entr" presetSubtype="0" fill="hold" nodeType="withEffect">
-                                  <p:stCondLst>
-                                    <p:cond delay="0"/>
-                                  </p:stCondLst>
-                                  <p:childTnLst>
-                                    <p:set>
-                                      <p:cBhvr>
-                                        <p:cTn id="49" dur="1" fill="hold">
-                                          <p:stCondLst>
-                                            <p:cond delay="0"/>
-                                          </p:stCondLst>
-                                        </p:cTn>
-                                        <p:tgtEl>
-                                          <p:spTgt spid="29"/>
-                                        </p:tgtEl>
-                                        <p:attrNameLst>
-                                          <p:attrName>style.visibility</p:attrName>
-                                        </p:attrNameLst>
-                                      </p:cBhvr>
-                                      <p:to>
-                                        <p:strVal val="visible"/>
-                                      </p:to>
-                                    </p:set>
-                                    <p:animEffect transition="in" filter="fade">
-                                      <p:cBhvr>
-                                        <p:cTn id="50" dur="250"/>
-                                        <p:tgtEl>
-                                          <p:spTgt spid="29"/>
-                                        </p:tgtEl>
-                                      </p:cBhvr>
-                                    </p:animEffect>
-                                  </p:childTnLst>
-                                </p:cTn>
-                              </p:par>
-                              <p:par>
-                                <p:cTn id="51" presetID="10" presetClass="entr" presetSubtype="0" fill="hold" nodeType="withEffect">
-                                  <p:stCondLst>
-                                    <p:cond delay="0"/>
-                                  </p:stCondLst>
-                                  <p:childTnLst>
-                                    <p:set>
-                                      <p:cBhvr>
-                                        <p:cTn id="52" dur="1" fill="hold">
-                                          <p:stCondLst>
-                                            <p:cond delay="0"/>
-                                          </p:stCondLst>
-                                        </p:cTn>
-                                        <p:tgtEl>
-                                          <p:spTgt spid="31"/>
-                                        </p:tgtEl>
-                                        <p:attrNameLst>
-                                          <p:attrName>style.visibility</p:attrName>
-                                        </p:attrNameLst>
-                                      </p:cBhvr>
-                                      <p:to>
-                                        <p:strVal val="visible"/>
-                                      </p:to>
-                                    </p:set>
-                                    <p:animEffect transition="in" filter="fade">
-                                      <p:cBhvr>
-                                        <p:cTn id="53" dur="250"/>
-                                        <p:tgtEl>
-                                          <p:spTgt spid="31"/>
-                                        </p:tgtEl>
-                                      </p:cBhvr>
-                                    </p:animEffect>
-                                  </p:childTnLst>
-                                </p:cTn>
-                              </p:par>
-                              <p:par>
-                                <p:cTn id="54" presetID="10" presetClass="entr" presetSubtype="0" fill="hold" nodeType="withEffect">
-                                  <p:stCondLst>
-                                    <p:cond delay="0"/>
-                                  </p:stCondLst>
-                                  <p:childTnLst>
-                                    <p:set>
-                                      <p:cBhvr>
-                                        <p:cTn id="55" dur="1" fill="hold">
-                                          <p:stCondLst>
-                                            <p:cond delay="0"/>
-                                          </p:stCondLst>
-                                        </p:cTn>
-                                        <p:tgtEl>
-                                          <p:spTgt spid="33"/>
-                                        </p:tgtEl>
-                                        <p:attrNameLst>
-                                          <p:attrName>style.visibility</p:attrName>
-                                        </p:attrNameLst>
-                                      </p:cBhvr>
-                                      <p:to>
-                                        <p:strVal val="visible"/>
-                                      </p:to>
-                                    </p:set>
-                                    <p:animEffect transition="in" filter="fade">
-                                      <p:cBhvr>
-                                        <p:cTn id="56" dur="250"/>
-                                        <p:tgtEl>
-                                          <p:spTgt spid="33"/>
-                                        </p:tgtEl>
-                                      </p:cBhvr>
-                                    </p:animEffect>
-                                  </p:childTnLst>
-                                </p:cTn>
-                              </p:par>
-                            </p:childTnLst>
-                          </p:cTn>
-                        </p:par>
-                        <p:par>
-                          <p:cTn id="57" fill="hold">
-                            <p:stCondLst>
-                              <p:cond delay="500"/>
-                            </p:stCondLst>
-                            <p:childTnLst>
-                              <p:par>
-                                <p:cTn id="58" presetID="10" presetClass="entr" presetSubtype="0" fill="hold" grpId="0" nodeType="afterEffect">
-                                  <p:stCondLst>
-                                    <p:cond delay="0"/>
-                                  </p:stCondLst>
-                                  <p:childTnLst>
-                                    <p:set>
-                                      <p:cBhvr>
-                                        <p:cTn id="59" dur="1" fill="hold">
-                                          <p:stCondLst>
-                                            <p:cond delay="0"/>
-                                          </p:stCondLst>
-                                        </p:cTn>
-                                        <p:tgtEl>
-                                          <p:spTgt spid="36"/>
-                                        </p:tgtEl>
-                                        <p:attrNameLst>
-                                          <p:attrName>style.visibility</p:attrName>
-                                        </p:attrNameLst>
-                                      </p:cBhvr>
-                                      <p:to>
-                                        <p:strVal val="visible"/>
-                                      </p:to>
-                                    </p:set>
-                                    <p:animEffect transition="in" filter="fade">
-                                      <p:cBhvr>
-                                        <p:cTn id="60" dur="250"/>
-                                        <p:tgtEl>
-                                          <p:spTgt spid="36"/>
-                                        </p:tgtEl>
-                                      </p:cBhvr>
-                                    </p:animEffect>
-                                  </p:childTnLst>
-                                </p:cTn>
-                              </p:par>
-                            </p:childTnLst>
-                          </p:cTn>
-                        </p:par>
-                        <p:par>
-                          <p:cTn id="61" fill="hold">
-                            <p:stCondLst>
-                              <p:cond delay="750"/>
-                            </p:stCondLst>
-                            <p:childTnLst>
-                              <p:par>
-                                <p:cTn id="62" presetID="10" presetClass="entr" presetSubtype="0" fill="hold" nodeType="afterEffect">
-                                  <p:stCondLst>
-                                    <p:cond delay="0"/>
-                                  </p:stCondLst>
-                                  <p:childTnLst>
-                                    <p:set>
-                                      <p:cBhvr>
-                                        <p:cTn id="63" dur="1" fill="hold">
-                                          <p:stCondLst>
-                                            <p:cond delay="0"/>
-                                          </p:stCondLst>
-                                        </p:cTn>
-                                        <p:tgtEl>
-                                          <p:spTgt spid="37"/>
-                                        </p:tgtEl>
-                                        <p:attrNameLst>
-                                          <p:attrName>style.visibility</p:attrName>
-                                        </p:attrNameLst>
-                                      </p:cBhvr>
-                                      <p:to>
-                                        <p:strVal val="visible"/>
-                                      </p:to>
-                                    </p:set>
-                                    <p:animEffect transition="in" filter="fade">
-                                      <p:cBhvr>
-                                        <p:cTn id="64" dur="250"/>
-                                        <p:tgtEl>
-                                          <p:spTgt spid="37"/>
                                         </p:tgtEl>
                                       </p:cBhvr>
                                     </p:animEffect>
@@ -11215,6 +11245,199 @@
                                           </p:stCondLst>
                                         </p:cTn>
                                         <p:tgtEl>
+                                          <p:spTgt spid="29"/>
+                                        </p:tgtEl>
+                                        <p:attrNameLst>
+                                          <p:attrName>style.visibility</p:attrName>
+                                        </p:attrNameLst>
+                                      </p:cBhvr>
+                                      <p:to>
+                                        <p:strVal val="visible"/>
+                                      </p:to>
+                                    </p:set>
+                                    <p:animEffect transition="in" filter="fade">
+                                      <p:cBhvr>
+                                        <p:cTn id="67" dur="250"/>
+                                        <p:tgtEl>
+                                          <p:spTgt spid="29"/>
+                                        </p:tgtEl>
+                                      </p:cBhvr>
+                                    </p:animEffect>
+                                  </p:childTnLst>
+                                </p:cTn>
+                              </p:par>
+                              <p:par>
+                                <p:cTn id="68" presetID="10" presetClass="entr" presetSubtype="0" fill="hold" nodeType="withEffect">
+                                  <p:stCondLst>
+                                    <p:cond delay="0"/>
+                                  </p:stCondLst>
+                                  <p:childTnLst>
+                                    <p:set>
+                                      <p:cBhvr>
+                                        <p:cTn id="69" dur="1" fill="hold">
+                                          <p:stCondLst>
+                                            <p:cond delay="0"/>
+                                          </p:stCondLst>
+                                        </p:cTn>
+                                        <p:tgtEl>
+                                          <p:spTgt spid="31"/>
+                                        </p:tgtEl>
+                                        <p:attrNameLst>
+                                          <p:attrName>style.visibility</p:attrName>
+                                        </p:attrNameLst>
+                                      </p:cBhvr>
+                                      <p:to>
+                                        <p:strVal val="visible"/>
+                                      </p:to>
+                                    </p:set>
+                                    <p:animEffect transition="in" filter="fade">
+                                      <p:cBhvr>
+                                        <p:cTn id="70" dur="250"/>
+                                        <p:tgtEl>
+                                          <p:spTgt spid="31"/>
+                                        </p:tgtEl>
+                                      </p:cBhvr>
+                                    </p:animEffect>
+                                  </p:childTnLst>
+                                </p:cTn>
+                              </p:par>
+                              <p:par>
+                                <p:cTn id="71" presetID="10" presetClass="entr" presetSubtype="0" fill="hold" nodeType="withEffect">
+                                  <p:stCondLst>
+                                    <p:cond delay="0"/>
+                                  </p:stCondLst>
+                                  <p:childTnLst>
+                                    <p:set>
+                                      <p:cBhvr>
+                                        <p:cTn id="72" dur="1" fill="hold">
+                                          <p:stCondLst>
+                                            <p:cond delay="0"/>
+                                          </p:stCondLst>
+                                        </p:cTn>
+                                        <p:tgtEl>
+                                          <p:spTgt spid="33"/>
+                                        </p:tgtEl>
+                                        <p:attrNameLst>
+                                          <p:attrName>style.visibility</p:attrName>
+                                        </p:attrNameLst>
+                                      </p:cBhvr>
+                                      <p:to>
+                                        <p:strVal val="visible"/>
+                                      </p:to>
+                                    </p:set>
+                                    <p:animEffect transition="in" filter="fade">
+                                      <p:cBhvr>
+                                        <p:cTn id="73" dur="250"/>
+                                        <p:tgtEl>
+                                          <p:spTgt spid="33"/>
+                                        </p:tgtEl>
+                                      </p:cBhvr>
+                                    </p:animEffect>
+                                  </p:childTnLst>
+                                </p:cTn>
+                              </p:par>
+                            </p:childTnLst>
+                          </p:cTn>
+                        </p:par>
+                        <p:par>
+                          <p:cTn id="74" fill="hold">
+                            <p:stCondLst>
+                              <p:cond delay="500"/>
+                            </p:stCondLst>
+                            <p:childTnLst>
+                              <p:par>
+                                <p:cTn id="75" presetID="10" presetClass="entr" presetSubtype="0" fill="hold" grpId="0" nodeType="afterEffect">
+                                  <p:stCondLst>
+                                    <p:cond delay="0"/>
+                                  </p:stCondLst>
+                                  <p:childTnLst>
+                                    <p:set>
+                                      <p:cBhvr>
+                                        <p:cTn id="76" dur="1" fill="hold">
+                                          <p:stCondLst>
+                                            <p:cond delay="0"/>
+                                          </p:stCondLst>
+                                        </p:cTn>
+                                        <p:tgtEl>
+                                          <p:spTgt spid="36"/>
+                                        </p:tgtEl>
+                                        <p:attrNameLst>
+                                          <p:attrName>style.visibility</p:attrName>
+                                        </p:attrNameLst>
+                                      </p:cBhvr>
+                                      <p:to>
+                                        <p:strVal val="visible"/>
+                                      </p:to>
+                                    </p:set>
+                                    <p:animEffect transition="in" filter="fade">
+                                      <p:cBhvr>
+                                        <p:cTn id="77" dur="250"/>
+                                        <p:tgtEl>
+                                          <p:spTgt spid="36"/>
+                                        </p:tgtEl>
+                                      </p:cBhvr>
+                                    </p:animEffect>
+                                  </p:childTnLst>
+                                </p:cTn>
+                              </p:par>
+                            </p:childTnLst>
+                          </p:cTn>
+                        </p:par>
+                        <p:par>
+                          <p:cTn id="78" fill="hold">
+                            <p:stCondLst>
+                              <p:cond delay="750"/>
+                            </p:stCondLst>
+                            <p:childTnLst>
+                              <p:par>
+                                <p:cTn id="79" presetID="10" presetClass="entr" presetSubtype="0" fill="hold" nodeType="afterEffect">
+                                  <p:stCondLst>
+                                    <p:cond delay="0"/>
+                                  </p:stCondLst>
+                                  <p:childTnLst>
+                                    <p:set>
+                                      <p:cBhvr>
+                                        <p:cTn id="80" dur="1" fill="hold">
+                                          <p:stCondLst>
+                                            <p:cond delay="0"/>
+                                          </p:stCondLst>
+                                        </p:cTn>
+                                        <p:tgtEl>
+                                          <p:spTgt spid="37"/>
+                                        </p:tgtEl>
+                                        <p:attrNameLst>
+                                          <p:attrName>style.visibility</p:attrName>
+                                        </p:attrNameLst>
+                                      </p:cBhvr>
+                                      <p:to>
+                                        <p:strVal val="visible"/>
+                                      </p:to>
+                                    </p:set>
+                                    <p:animEffect transition="in" filter="fade">
+                                      <p:cBhvr>
+                                        <p:cTn id="81" dur="250"/>
+                                        <p:tgtEl>
+                                          <p:spTgt spid="37"/>
+                                        </p:tgtEl>
+                                      </p:cBhvr>
+                                    </p:animEffect>
+                                  </p:childTnLst>
+                                </p:cTn>
+                              </p:par>
+                              <p:par>
+                                <p:cTn id="82" presetID="10" presetClass="entr" presetSubtype="0" fill="hold" nodeType="withEffect">
+                                  <p:stCondLst>
+                                    <p:cond delay="0"/>
+                                  </p:stCondLst>
+                                  <p:childTnLst>
+                                    <p:set>
+                                      <p:cBhvr>
+                                        <p:cTn id="83" dur="1" fill="hold">
+                                          <p:stCondLst>
+                                            <p:cond delay="0"/>
+                                          </p:stCondLst>
+                                        </p:cTn>
+                                        <p:tgtEl>
                                           <p:spTgt spid="39"/>
                                         </p:tgtEl>
                                         <p:attrNameLst>
@@ -11227,7 +11450,7 @@
                                     </p:set>
                                     <p:animEffect transition="in" filter="fade">
                                       <p:cBhvr>
-                                        <p:cTn id="67" dur="250"/>
+                                        <p:cTn id="84" dur="250"/>
                                         <p:tgtEl>
                                           <p:spTgt spid="39"/>
                                         </p:tgtEl>
@@ -11264,6 +11487,7 @@
       </p:par>
     </p:tnLst>
     <p:bldLst>
+      <p:bldP spid="4" grpId="0" uiExpand="1" build="p"/>
       <p:bldP spid="6" grpId="0" animBg="1"/>
       <p:bldP spid="7" grpId="0" animBg="1"/>
       <p:bldP spid="8" grpId="0" animBg="1"/>
@@ -11600,6 +11824,58 @@
               <a:rPr lang="en-US" sz="4800" dirty="0"/>
               <a:t>Demonstration</a:t>
             </a:r>
+          </a:p>
+        </p:txBody>
+      </p:sp>
+      <p:sp>
+        <p:nvSpPr>
+          <p:cNvPr id="5" name="Rectangle 4">
+            <a:extLst>
+              <a:ext uri="{FF2B5EF4-FFF2-40B4-BE49-F238E27FC236}">
+                <a16:creationId xmlns:a16="http://schemas.microsoft.com/office/drawing/2014/main" id="{2E3784A7-CA6E-5F40-8B16-EBDB8E837E35}"/>
+              </a:ext>
+            </a:extLst>
+          </p:cNvPr>
+          <p:cNvSpPr/>
+          <p:nvPr/>
+        </p:nvSpPr>
+        <p:spPr>
+          <a:xfrm>
+            <a:off x="10067731" y="6468303"/>
+            <a:ext cx="1481538" cy="268399"/>
+          </a:xfrm>
+          <a:prstGeom prst="rect">
+            <a:avLst/>
+          </a:prstGeom>
+          <a:solidFill>
+            <a:schemeClr val="bg1"/>
+          </a:solidFill>
+          <a:ln>
+            <a:noFill/>
+          </a:ln>
+        </p:spPr>
+        <p:style>
+          <a:lnRef idx="2">
+            <a:schemeClr val="accent1">
+              <a:shade val="50000"/>
+            </a:schemeClr>
+          </a:lnRef>
+          <a:fillRef idx="1">
+            <a:schemeClr val="accent1"/>
+          </a:fillRef>
+          <a:effectRef idx="0">
+            <a:schemeClr val="accent1"/>
+          </a:effectRef>
+          <a:fontRef idx="minor">
+            <a:schemeClr val="lt1"/>
+          </a:fontRef>
+        </p:style>
+        <p:txBody>
+          <a:bodyPr rtlCol="0" anchor="ctr"/>
+          <a:lstStyle/>
+          <a:p>
+            <a:pPr algn="ctr"/>
+            <a:endParaRPr lang="en-US"/>
           </a:p>
         </p:txBody>
       </p:sp>
@@ -12511,6 +12787,14 @@
 </file>
 
 <file path=customXml/item2.xml><?xml version="1.0" encoding="utf-8"?>
+<p:properties xmlns:p="http://schemas.microsoft.com/office/2006/metadata/properties" xmlns:xsi="http://www.w3.org/2001/XMLSchema-instance" xmlns:pc="http://schemas.microsoft.com/office/infopath/2007/PartnerControls">
+  <documentManagement>
+    <MediaServiceKeyPoints xmlns="71af3243-3dd4-4a8d-8c0d-dd76da1f02a5" xsi:nil="true"/>
+  </documentManagement>
+</p:properties>
+</file>
+
+<file path=customXml/item3.xml><?xml version="1.0" encoding="utf-8"?>
 <ct:contentTypeSchema xmlns:ct="http://schemas.microsoft.com/office/2006/metadata/contentType" xmlns:ma="http://schemas.microsoft.com/office/2006/metadata/properties/metaAttributes" ct:_="" ma:_="" ma:contentTypeName="Document" ma:contentTypeID="0x01010079F111ED35F8CC479449609E8A0923A6" ma:contentTypeVersion="11" ma:contentTypeDescription="Create a new document." ma:contentTypeScope="" ma:versionID="96291512c1ee715ab617f4c07df79fc1">
   <xsd:schema xmlns:xsd="http://www.w3.org/2001/XMLSchema" xmlns:xs="http://www.w3.org/2001/XMLSchema" xmlns:p="http://schemas.microsoft.com/office/2006/metadata/properties" xmlns:ns2="71af3243-3dd4-4a8d-8c0d-dd76da1f02a5" xmlns:ns3="16c05727-aa75-4e4a-9b5f-8a80a1165891" targetNamespace="http://schemas.microsoft.com/office/2006/metadata/properties" ma:root="true" ma:fieldsID="8256c27c40ca5c40ce1cf6c44f0205df" ns2:_="" ns3:_="">
     <xsd:import namespace="71af3243-3dd4-4a8d-8c0d-dd76da1f02a5"/>
@@ -12721,14 +13005,6 @@
 </ct:contentTypeSchema>
 </file>
 
-<file path=customXml/item3.xml><?xml version="1.0" encoding="utf-8"?>
-<p:properties xmlns:p="http://schemas.microsoft.com/office/2006/metadata/properties" xmlns:xsi="http://www.w3.org/2001/XMLSchema-instance" xmlns:pc="http://schemas.microsoft.com/office/infopath/2007/PartnerControls">
-  <documentManagement>
-    <MediaServiceKeyPoints xmlns="71af3243-3dd4-4a8d-8c0d-dd76da1f02a5" xsi:nil="true"/>
-  </documentManagement>
-</p:properties>
-</file>
-
 <file path=customXml/itemProps1.xml><?xml version="1.0" encoding="utf-8"?>
 <ds:datastoreItem xmlns:ds="http://schemas.openxmlformats.org/officeDocument/2006/customXml" ds:itemID="{89B3E157-1CAC-4231-A2EC-E93952D57E42}">
   <ds:schemaRefs>
@@ -12738,6 +13014,23 @@
 </file>
 
 <file path=customXml/itemProps2.xml><?xml version="1.0" encoding="utf-8"?>
+<ds:datastoreItem xmlns:ds="http://schemas.openxmlformats.org/officeDocument/2006/customXml" ds:itemID="{22E71848-B78E-4D58-BFA5-D2D5918911CD}">
+  <ds:schemaRefs>
+    <ds:schemaRef ds:uri="http://schemas.microsoft.com/office/2006/metadata/properties"/>
+    <ds:schemaRef ds:uri="http://schemas.microsoft.com/office/2006/documentManagement/types"/>
+    <ds:schemaRef ds:uri="http://purl.org/dc/terms/"/>
+    <ds:schemaRef ds:uri="http://www.w3.org/XML/1998/namespace"/>
+    <ds:schemaRef ds:uri="71af3243-3dd4-4a8d-8c0d-dd76da1f02a5"/>
+    <ds:schemaRef ds:uri="http://purl.org/dc/dcmitype/"/>
+    <ds:schemaRef ds:uri="http://purl.org/dc/elements/1.1/"/>
+    <ds:schemaRef ds:uri="http://schemas.microsoft.com/office/infopath/2007/PartnerControls"/>
+    <ds:schemaRef ds:uri="http://schemas.openxmlformats.org/package/2006/metadata/core-properties"/>
+    <ds:schemaRef ds:uri="16c05727-aa75-4e4a-9b5f-8a80a1165891"/>
+  </ds:schemaRefs>
+</ds:datastoreItem>
+</file>
+
+<file path=customXml/itemProps3.xml><?xml version="1.0" encoding="utf-8"?>
 <ds:datastoreItem xmlns:ds="http://schemas.openxmlformats.org/officeDocument/2006/customXml" ds:itemID="{80B16AC2-D7DD-48B6-919A-4ADE887D756B}">
   <ds:schemaRefs>
     <ds:schemaRef ds:uri="http://schemas.microsoft.com/office/2006/metadata/contentType"/>
@@ -12754,21 +13047,4 @@
     <ds:schemaRef ds:uri="http://schemas.microsoft.com/internal/obd"/>
   </ds:schemaRefs>
 </ds:datastoreItem>
-</file>
-
-<file path=customXml/itemProps3.xml><?xml version="1.0" encoding="utf-8"?>
-<ds:datastoreItem xmlns:ds="http://schemas.openxmlformats.org/officeDocument/2006/customXml" ds:itemID="{22E71848-B78E-4D58-BFA5-D2D5918911CD}">
-  <ds:schemaRefs>
-    <ds:schemaRef ds:uri="http://schemas.microsoft.com/office/2006/metadata/properties"/>
-    <ds:schemaRef ds:uri="http://schemas.microsoft.com/office/2006/documentManagement/types"/>
-    <ds:schemaRef ds:uri="http://purl.org/dc/terms/"/>
-    <ds:schemaRef ds:uri="http://www.w3.org/XML/1998/namespace"/>
-    <ds:schemaRef ds:uri="71af3243-3dd4-4a8d-8c0d-dd76da1f02a5"/>
-    <ds:schemaRef ds:uri="http://purl.org/dc/dcmitype/"/>
-    <ds:schemaRef ds:uri="http://purl.org/dc/elements/1.1/"/>
-    <ds:schemaRef ds:uri="http://schemas.microsoft.com/office/infopath/2007/PartnerControls"/>
-    <ds:schemaRef ds:uri="http://schemas.openxmlformats.org/package/2006/metadata/core-properties"/>
-    <ds:schemaRef ds:uri="16c05727-aa75-4e4a-9b5f-8a80a1165891"/>
-  </ds:schemaRefs>
-</ds:datastoreItem>
 </file>
</xml_diff>